<commit_message>
Cleanup before presentation - contd.
</commit_message>
<xml_diff>
--- a/ppt/Spock-HandsOn.pptx
+++ b/ppt/Spock-HandsOn.pptx
@@ -5,24 +5,25 @@
     <p:sldMasterId id="2147483648" r:id="rId1"/>
   </p:sldMasterIdLst>
   <p:notesMasterIdLst>
-    <p:notesMasterId r:id="rId17"/>
+    <p:notesMasterId r:id="rId18"/>
   </p:notesMasterIdLst>
   <p:sldIdLst>
     <p:sldId id="256" r:id="rId2"/>
     <p:sldId id="257" r:id="rId3"/>
     <p:sldId id="258" r:id="rId4"/>
     <p:sldId id="259" r:id="rId5"/>
-    <p:sldId id="260" r:id="rId6"/>
-    <p:sldId id="262" r:id="rId7"/>
-    <p:sldId id="263" r:id="rId8"/>
-    <p:sldId id="264" r:id="rId9"/>
-    <p:sldId id="265" r:id="rId10"/>
-    <p:sldId id="266" r:id="rId11"/>
-    <p:sldId id="267" r:id="rId12"/>
-    <p:sldId id="268" r:id="rId13"/>
-    <p:sldId id="269" r:id="rId14"/>
-    <p:sldId id="270" r:id="rId15"/>
-    <p:sldId id="261" r:id="rId16"/>
+    <p:sldId id="271" r:id="rId6"/>
+    <p:sldId id="260" r:id="rId7"/>
+    <p:sldId id="262" r:id="rId8"/>
+    <p:sldId id="263" r:id="rId9"/>
+    <p:sldId id="264" r:id="rId10"/>
+    <p:sldId id="265" r:id="rId11"/>
+    <p:sldId id="268" r:id="rId12"/>
+    <p:sldId id="269" r:id="rId13"/>
+    <p:sldId id="270" r:id="rId14"/>
+    <p:sldId id="266" r:id="rId15"/>
+    <p:sldId id="267" r:id="rId16"/>
+    <p:sldId id="261" r:id="rId17"/>
   </p:sldIdLst>
   <p:sldSz cx="12192000" cy="6858000"/>
   <p:notesSz cx="6858000" cy="9144000"/>
@@ -121,6 +122,11 @@
       </a:defRPr>
     </a:lvl9pPr>
   </p:defaultTextStyle>
+  <p:extLst>
+    <p:ext uri="{EFAFB233-063F-42B5-8137-9DF3F51BA10A}">
+      <p15:sldGuideLst xmlns:p15="http://schemas.microsoft.com/office/powerpoint/2012/main"/>
+    </p:ext>
+  </p:extLst>
 </p:presentation>
 </file>
 
@@ -206,7 +212,7 @@
           <a:p>
             <a:fld id="{64C8A15F-DC1E-4302-89CF-80EA3A1B2F23}" type="datetimeFigureOut">
               <a:rPr lang="en-US" smtClean="0"/>
-              <a:t>9/9/2019</a:t>
+              <a:t>9/10/19</a:t>
             </a:fld>
             <a:endParaRPr lang="en-US"/>
           </a:p>
@@ -728,7 +734,7 @@
           <a:p>
             <a:fld id="{670EF9F8-2717-4084-B182-49E9CF8593F5}" type="slidenum">
               <a:rPr lang="en-US" smtClean="0"/>
-              <a:t>13</a:t>
+              <a:t>12</a:t>
             </a:fld>
             <a:endParaRPr lang="en-US"/>
           </a:p>
@@ -812,7 +818,7 @@
           <a:p>
             <a:fld id="{670EF9F8-2717-4084-B182-49E9CF8593F5}" type="slidenum">
               <a:rPr lang="en-US" smtClean="0"/>
-              <a:t>15</a:t>
+              <a:t>16</a:t>
             </a:fld>
             <a:endParaRPr lang="en-US"/>
           </a:p>
@@ -978,7 +984,7 @@
           <a:p>
             <a:fld id="{857D950D-3891-4166-B38C-1487156A7223}" type="datetimeFigureOut">
               <a:rPr lang="en-US" smtClean="0"/>
-              <a:t>9/9/2019</a:t>
+              <a:t>9/10/19</a:t>
             </a:fld>
             <a:endParaRPr lang="en-US"/>
           </a:p>
@@ -1176,7 +1182,7 @@
           <a:p>
             <a:fld id="{857D950D-3891-4166-B38C-1487156A7223}" type="datetimeFigureOut">
               <a:rPr lang="en-US" smtClean="0"/>
-              <a:t>9/9/2019</a:t>
+              <a:t>9/10/19</a:t>
             </a:fld>
             <a:endParaRPr lang="en-US"/>
           </a:p>
@@ -1384,7 +1390,7 @@
           <a:p>
             <a:fld id="{857D950D-3891-4166-B38C-1487156A7223}" type="datetimeFigureOut">
               <a:rPr lang="en-US" smtClean="0"/>
-              <a:t>9/9/2019</a:t>
+              <a:t>9/10/19</a:t>
             </a:fld>
             <a:endParaRPr lang="en-US"/>
           </a:p>
@@ -1582,7 +1588,7 @@
           <a:p>
             <a:fld id="{857D950D-3891-4166-B38C-1487156A7223}" type="datetimeFigureOut">
               <a:rPr lang="en-US" smtClean="0"/>
-              <a:t>9/9/2019</a:t>
+              <a:t>9/10/19</a:t>
             </a:fld>
             <a:endParaRPr lang="en-US"/>
           </a:p>
@@ -1857,7 +1863,7 @@
           <a:p>
             <a:fld id="{857D950D-3891-4166-B38C-1487156A7223}" type="datetimeFigureOut">
               <a:rPr lang="en-US" smtClean="0"/>
-              <a:t>9/9/2019</a:t>
+              <a:t>9/10/19</a:t>
             </a:fld>
             <a:endParaRPr lang="en-US"/>
           </a:p>
@@ -2122,7 +2128,7 @@
           <a:p>
             <a:fld id="{857D950D-3891-4166-B38C-1487156A7223}" type="datetimeFigureOut">
               <a:rPr lang="en-US" smtClean="0"/>
-              <a:t>9/9/2019</a:t>
+              <a:t>9/10/19</a:t>
             </a:fld>
             <a:endParaRPr lang="en-US"/>
           </a:p>
@@ -2534,7 +2540,7 @@
           <a:p>
             <a:fld id="{857D950D-3891-4166-B38C-1487156A7223}" type="datetimeFigureOut">
               <a:rPr lang="en-US" smtClean="0"/>
-              <a:t>9/9/2019</a:t>
+              <a:t>9/10/19</a:t>
             </a:fld>
             <a:endParaRPr lang="en-US"/>
           </a:p>
@@ -2675,7 +2681,7 @@
           <a:p>
             <a:fld id="{857D950D-3891-4166-B38C-1487156A7223}" type="datetimeFigureOut">
               <a:rPr lang="en-US" smtClean="0"/>
-              <a:t>9/9/2019</a:t>
+              <a:t>9/10/19</a:t>
             </a:fld>
             <a:endParaRPr lang="en-US"/>
           </a:p>
@@ -2788,7 +2794,7 @@
           <a:p>
             <a:fld id="{857D950D-3891-4166-B38C-1487156A7223}" type="datetimeFigureOut">
               <a:rPr lang="en-US" smtClean="0"/>
-              <a:t>9/9/2019</a:t>
+              <a:t>9/10/19</a:t>
             </a:fld>
             <a:endParaRPr lang="en-US"/>
           </a:p>
@@ -3099,7 +3105,7 @@
           <a:p>
             <a:fld id="{857D950D-3891-4166-B38C-1487156A7223}" type="datetimeFigureOut">
               <a:rPr lang="en-US" smtClean="0"/>
-              <a:t>9/9/2019</a:t>
+              <a:t>9/10/19</a:t>
             </a:fld>
             <a:endParaRPr lang="en-US"/>
           </a:p>
@@ -3387,7 +3393,7 @@
           <a:p>
             <a:fld id="{857D950D-3891-4166-B38C-1487156A7223}" type="datetimeFigureOut">
               <a:rPr lang="en-US" smtClean="0"/>
-              <a:t>9/9/2019</a:t>
+              <a:t>9/10/19</a:t>
             </a:fld>
             <a:endParaRPr lang="en-US"/>
           </a:p>
@@ -3628,7 +3634,7 @@
           <a:p>
             <a:fld id="{857D950D-3891-4166-B38C-1487156A7223}" type="datetimeFigureOut">
               <a:rPr lang="en-US" smtClean="0"/>
-              <a:t>9/9/2019</a:t>
+              <a:t>9/10/19</a:t>
             </a:fld>
             <a:endParaRPr lang="en-US"/>
           </a:p>
@@ -4138,7 +4144,7 @@
           <p:cNvPr id="2" name="Title 1">
             <a:extLst>
               <a:ext uri="{FF2B5EF4-FFF2-40B4-BE49-F238E27FC236}">
-                <a16:creationId xmlns:a16="http://schemas.microsoft.com/office/drawing/2014/main" id="{EB412D7F-D4A8-49E0-AC28-E5D3BDAF513D}"/>
+                <a16:creationId xmlns:a16="http://schemas.microsoft.com/office/drawing/2014/main" id="{77C72468-1134-4985-A956-45364AAF84FB}"/>
               </a:ext>
             </a:extLst>
           </p:cNvPr>
@@ -4156,7 +4162,7 @@
           <a:p>
             <a:r>
               <a:rPr lang="pl-PL" dirty="0"/>
-              <a:t>Six: IgnoreIf, Requires</a:t>
+              <a:t>Five: Testing exceptions</a:t>
             </a:r>
             <a:endParaRPr lang="en-US" dirty="0"/>
           </a:p>
@@ -4167,7 +4173,7 @@
           <p:cNvPr id="3" name="Content Placeholder 2">
             <a:extLst>
               <a:ext uri="{FF2B5EF4-FFF2-40B4-BE49-F238E27FC236}">
-                <a16:creationId xmlns:a16="http://schemas.microsoft.com/office/drawing/2014/main" id="{91BA6425-9C75-4C98-B2EC-56470896570E}"/>
+                <a16:creationId xmlns:a16="http://schemas.microsoft.com/office/drawing/2014/main" id="{8B27E01F-89F6-4F5F-A0D8-57D0463F0C7A}"/>
               </a:ext>
             </a:extLst>
           </p:cNvPr>
@@ -4185,21 +4191,29 @@
           <a:p>
             <a:r>
               <a:rPr lang="pl-PL" dirty="0"/>
-              <a:t>Conditionally execute tests depending on the environment:</a:t>
+              <a:t>In</a:t>
+            </a:r>
+            <a:r>
+              <a:rPr lang="pl-PL" i="1" dirty="0"/>
+              <a:t> then: </a:t>
+            </a:r>
+            <a:r>
+              <a:rPr lang="pl-PL" dirty="0"/>
+              <a:t> you can check if exception was thrown/not thrown</a:t>
             </a:r>
           </a:p>
           <a:p>
             <a:pPr lvl="1"/>
             <a:r>
               <a:rPr lang="pl-PL" dirty="0"/>
-              <a:t>On particular JVM,</a:t>
+              <a:t>thrown(ExceptionClass) </a:t>
             </a:r>
           </a:p>
           <a:p>
             <a:pPr lvl="1"/>
             <a:r>
               <a:rPr lang="pl-PL" dirty="0"/>
-              <a:t>On particular system,</a:t>
+              <a:t>notThrown(ExceptionClass)</a:t>
             </a:r>
           </a:p>
           <a:p>
@@ -4209,7 +4223,14 @@
           <a:p>
             <a:r>
               <a:rPr lang="pl-PL" dirty="0"/>
-              <a:t>Can use your own static methods too!</a:t>
+              <a:t> If needed, can also assign the Exception and test its fields</a:t>
+            </a:r>
+          </a:p>
+          <a:p>
+            <a:pPr lvl="1"/>
+            <a:r>
+              <a:rPr lang="pl-PL" dirty="0"/>
+              <a:t>e.g. checking messages</a:t>
             </a:r>
           </a:p>
         </p:txBody>
@@ -4217,7 +4238,7 @@
     </p:spTree>
     <p:extLst>
       <p:ext uri="{BB962C8B-B14F-4D97-AF65-F5344CB8AC3E}">
-        <p14:creationId xmlns:p14="http://schemas.microsoft.com/office/powerpoint/2010/main" val="172977477"/>
+        <p14:creationId xmlns:p14="http://schemas.microsoft.com/office/powerpoint/2010/main" val="3133017702"/>
       </p:ext>
     </p:extLst>
   </p:cSld>
@@ -4249,7 +4270,7 @@
           <p:cNvPr id="2" name="Title 1">
             <a:extLst>
               <a:ext uri="{FF2B5EF4-FFF2-40B4-BE49-F238E27FC236}">
-                <a16:creationId xmlns:a16="http://schemas.microsoft.com/office/drawing/2014/main" id="{62BFE644-28B8-487C-AD40-EC60928ECBC4}"/>
+                <a16:creationId xmlns:a16="http://schemas.microsoft.com/office/drawing/2014/main" id="{F8A060E7-56F6-40F0-A7B2-BA51DFA5B1C1}"/>
               </a:ext>
             </a:extLst>
           </p:cNvPr>
@@ -4266,8 +4287,12 @@
           <a:lstStyle/>
           <a:p>
             <a:r>
-              <a:rPr lang="pl-PL" dirty="0"/>
-              <a:t>Seven: Retry</a:t>
+              <a:rPr lang="pl-PL" dirty="0" err="1"/>
+              <a:t>Six</a:t>
+            </a:r>
+            <a:r>
+              <a:rPr lang="pl-PL" dirty="0"/>
+              <a:t>: Setup, Cleanup</a:t>
             </a:r>
             <a:endParaRPr lang="en-US" dirty="0"/>
           </a:p>
@@ -4278,7 +4303,7 @@
           <p:cNvPr id="3" name="Content Placeholder 2">
             <a:extLst>
               <a:ext uri="{FF2B5EF4-FFF2-40B4-BE49-F238E27FC236}">
-                <a16:creationId xmlns:a16="http://schemas.microsoft.com/office/drawing/2014/main" id="{A9B88B67-ACF3-4D29-B242-7A62473F4EF9}"/>
+                <a16:creationId xmlns:a16="http://schemas.microsoft.com/office/drawing/2014/main" id="{99D968E2-9809-4210-944A-0FE9872576B2}"/>
               </a:ext>
             </a:extLst>
           </p:cNvPr>
@@ -4296,22 +4321,44 @@
           <a:p>
             <a:r>
               <a:rPr lang="pl-PL" dirty="0"/>
-              <a:t>Some tests may occasionally fail (and you expect that to happen)</a:t>
-            </a:r>
-          </a:p>
-          <a:p>
-            <a:pPr lvl="1"/>
-            <a:r>
-              <a:rPr lang="pl-PL" dirty="0"/>
-              <a:t>@Retry for the rescue!</a:t>
-            </a:r>
+              <a:t>Useful when many tests in the same class perform same actions before/after the test itself,</a:t>
+            </a:r>
+            <a:br>
+              <a:rPr lang="pl-PL" dirty="0"/>
+            </a:br>
+            <a:endParaRPr lang="pl-PL" dirty="0"/>
+          </a:p>
+          <a:p>
+            <a:r>
+              <a:rPr lang="pl-PL" dirty="0"/>
+              <a:t>Setup/Cleanup is invoked for each test (works with where: too!)</a:t>
+            </a:r>
+            <a:br>
+              <a:rPr lang="pl-PL" dirty="0"/>
+            </a:br>
+            <a:endParaRPr lang="pl-PL" dirty="0"/>
+          </a:p>
+          <a:p>
+            <a:r>
+              <a:rPr lang="pl-PL" dirty="0"/>
+              <a:t>SetupSpec/CleanupSpec for each test class</a:t>
+            </a:r>
+          </a:p>
+          <a:p>
+            <a:endParaRPr lang="pl-PL" dirty="0"/>
+          </a:p>
+          <a:p>
+            <a:endParaRPr lang="pl-PL" dirty="0"/>
+          </a:p>
+          <a:p>
+            <a:endParaRPr lang="en-US" dirty="0"/>
           </a:p>
         </p:txBody>
       </p:sp>
     </p:spTree>
     <p:extLst>
       <p:ext uri="{BB962C8B-B14F-4D97-AF65-F5344CB8AC3E}">
-        <p14:creationId xmlns:p14="http://schemas.microsoft.com/office/powerpoint/2010/main" val="1298915062"/>
+        <p14:creationId xmlns:p14="http://schemas.microsoft.com/office/powerpoint/2010/main" val="3359035810"/>
       </p:ext>
     </p:extLst>
   </p:cSld>
@@ -4343,7 +4390,7 @@
           <p:cNvPr id="2" name="Title 1">
             <a:extLst>
               <a:ext uri="{FF2B5EF4-FFF2-40B4-BE49-F238E27FC236}">
-                <a16:creationId xmlns:a16="http://schemas.microsoft.com/office/drawing/2014/main" id="{F8A060E7-56F6-40F0-A7B2-BA51DFA5B1C1}"/>
+                <a16:creationId xmlns:a16="http://schemas.microsoft.com/office/drawing/2014/main" id="{5A2EEB28-9CAF-4F54-8A2A-CDBFA3297E35}"/>
               </a:ext>
             </a:extLst>
           </p:cNvPr>
@@ -4360,8 +4407,12 @@
           <a:lstStyle/>
           <a:p>
             <a:r>
-              <a:rPr lang="pl-PL" dirty="0"/>
-              <a:t>Eight: Setup, Cleanup</a:t>
+              <a:rPr lang="pl-PL" dirty="0" err="1"/>
+              <a:t>Seven</a:t>
+            </a:r>
+            <a:r>
+              <a:rPr lang="pl-PL" dirty="0"/>
+              <a:t>: Mocking</a:t>
             </a:r>
             <a:endParaRPr lang="en-US" dirty="0"/>
           </a:p>
@@ -4372,7 +4423,7 @@
           <p:cNvPr id="3" name="Content Placeholder 2">
             <a:extLst>
               <a:ext uri="{FF2B5EF4-FFF2-40B4-BE49-F238E27FC236}">
-                <a16:creationId xmlns:a16="http://schemas.microsoft.com/office/drawing/2014/main" id="{99D968E2-9809-4210-944A-0FE9872576B2}"/>
+                <a16:creationId xmlns:a16="http://schemas.microsoft.com/office/drawing/2014/main" id="{8E515DB9-7B10-4C27-BF12-3F76B3961EAF}"/>
               </a:ext>
             </a:extLst>
           </p:cNvPr>
@@ -4390,36 +4441,45 @@
           <a:p>
             <a:r>
               <a:rPr lang="pl-PL" dirty="0"/>
-              <a:t>Useful when many tests in the same class perform same actions before/after the test itself,</a:t>
-            </a:r>
-            <a:br>
-              <a:rPr lang="pl-PL" dirty="0"/>
-            </a:br>
+              <a:t>Useful for checking if some interaction takes place</a:t>
+            </a:r>
+          </a:p>
+          <a:p>
             <a:endParaRPr lang="pl-PL" dirty="0"/>
           </a:p>
           <a:p>
             <a:r>
               <a:rPr lang="pl-PL" dirty="0"/>
-              <a:t>Setup/Cleanup is invoked for each test (works with where: too!)</a:t>
-            </a:r>
-            <a:br>
-              <a:rPr lang="pl-PL" dirty="0"/>
-            </a:br>
-            <a:endParaRPr lang="pl-PL" dirty="0"/>
-          </a:p>
-          <a:p>
-            <a:r>
-              <a:rPr lang="pl-PL" dirty="0"/>
-              <a:t>SetupSpec/CleanupSpec for each test class</a:t>
-            </a:r>
-          </a:p>
-          <a:p>
-            <a:endParaRPr lang="pl-PL" dirty="0"/>
-          </a:p>
-          <a:p>
-            <a:endParaRPr lang="pl-PL" dirty="0"/>
-          </a:p>
-          <a:p>
+              <a:t>Can count number of interactions</a:t>
+            </a:r>
+          </a:p>
+          <a:p>
+            <a:pPr lvl="1"/>
+            <a:r>
+              <a:rPr lang="pl-PL" dirty="0"/>
+              <a:t>Strict count</a:t>
+            </a:r>
+          </a:p>
+          <a:p>
+            <a:pPr lvl="1"/>
+            <a:r>
+              <a:rPr lang="pl-PL" dirty="0"/>
+              <a:t>Range count</a:t>
+            </a:r>
+          </a:p>
+          <a:p>
+            <a:pPr lvl="1"/>
+            <a:r>
+              <a:rPr lang="pl-PL" dirty="0"/>
+              <a:t>Per mock count</a:t>
+            </a:r>
+          </a:p>
+          <a:p>
+            <a:pPr lvl="1"/>
+            <a:r>
+              <a:rPr lang="pl-PL" dirty="0"/>
+              <a:t>All mock count</a:t>
+            </a:r>
             <a:endParaRPr lang="en-US" dirty="0"/>
           </a:p>
         </p:txBody>
@@ -4427,7 +4487,7 @@
     </p:spTree>
     <p:extLst>
       <p:ext uri="{BB962C8B-B14F-4D97-AF65-F5344CB8AC3E}">
-        <p14:creationId xmlns:p14="http://schemas.microsoft.com/office/powerpoint/2010/main" val="3359035810"/>
+        <p14:creationId xmlns:p14="http://schemas.microsoft.com/office/powerpoint/2010/main" val="168259700"/>
       </p:ext>
     </p:extLst>
   </p:cSld>
@@ -4459,7 +4519,7 @@
           <p:cNvPr id="2" name="Title 1">
             <a:extLst>
               <a:ext uri="{FF2B5EF4-FFF2-40B4-BE49-F238E27FC236}">
-                <a16:creationId xmlns:a16="http://schemas.microsoft.com/office/drawing/2014/main" id="{5A2EEB28-9CAF-4F54-8A2A-CDBFA3297E35}"/>
+                <a16:creationId xmlns:a16="http://schemas.microsoft.com/office/drawing/2014/main" id="{F6B59F71-2AA1-473B-8392-47DBF3A0050F}"/>
               </a:ext>
             </a:extLst>
           </p:cNvPr>
@@ -4476,8 +4536,12 @@
           <a:lstStyle/>
           <a:p>
             <a:r>
-              <a:rPr lang="pl-PL" dirty="0"/>
-              <a:t>Nine: Mocking</a:t>
+              <a:rPr lang="pl-PL" dirty="0" err="1"/>
+              <a:t>Eight</a:t>
+            </a:r>
+            <a:r>
+              <a:rPr lang="pl-PL" dirty="0"/>
+              <a:t>: Reporting</a:t>
             </a:r>
             <a:endParaRPr lang="en-US" dirty="0"/>
           </a:p>
@@ -4488,7 +4552,7 @@
           <p:cNvPr id="3" name="Content Placeholder 2">
             <a:extLst>
               <a:ext uri="{FF2B5EF4-FFF2-40B4-BE49-F238E27FC236}">
-                <a16:creationId xmlns:a16="http://schemas.microsoft.com/office/drawing/2014/main" id="{8E515DB9-7B10-4C27-BF12-3F76B3961EAF}"/>
+                <a16:creationId xmlns:a16="http://schemas.microsoft.com/office/drawing/2014/main" id="{EB5D0AA9-A5FC-4EE7-B1C0-355BC33680BB}"/>
               </a:ext>
             </a:extLst>
           </p:cNvPr>
@@ -4506,7 +4570,7 @@
           <a:p>
             <a:r>
               <a:rPr lang="pl-PL" dirty="0"/>
-              <a:t>Useful for checking if some interaction takes place</a:t>
+              <a:t>HTML reports after each run</a:t>
             </a:r>
           </a:p>
           <a:p>
@@ -4515,44 +4579,24 @@
           <a:p>
             <a:r>
               <a:rPr lang="pl-PL" dirty="0"/>
-              <a:t>Can count number of interactions</a:t>
-            </a:r>
-          </a:p>
-          <a:p>
-            <a:pPr lvl="1"/>
-            <a:r>
-              <a:rPr lang="pl-PL" dirty="0"/>
-              <a:t>Strict count</a:t>
-            </a:r>
-          </a:p>
-          <a:p>
-            <a:pPr lvl="1"/>
-            <a:r>
-              <a:rPr lang="pl-PL" dirty="0"/>
-              <a:t>Range count</a:t>
-            </a:r>
-          </a:p>
-          <a:p>
-            <a:pPr lvl="1"/>
-            <a:r>
-              <a:rPr lang="pl-PL" dirty="0"/>
-              <a:t>Per mock count</a:t>
-            </a:r>
-          </a:p>
-          <a:p>
-            <a:pPr lvl="1"/>
-            <a:r>
-              <a:rPr lang="pl-PL" dirty="0"/>
-              <a:t>All mock count</a:t>
-            </a:r>
-            <a:endParaRPr lang="en-US" dirty="0"/>
+              <a:t>Good visualization of performed steps</a:t>
+            </a:r>
+          </a:p>
+          <a:p>
+            <a:endParaRPr lang="pl-PL" dirty="0"/>
+          </a:p>
+          <a:p>
+            <a:r>
+              <a:rPr lang="pl-PL" dirty="0"/>
+              <a:t>Good visualization of errors</a:t>
+            </a:r>
           </a:p>
         </p:txBody>
       </p:sp>
     </p:spTree>
     <p:extLst>
       <p:ext uri="{BB962C8B-B14F-4D97-AF65-F5344CB8AC3E}">
-        <p14:creationId xmlns:p14="http://schemas.microsoft.com/office/powerpoint/2010/main" val="168259700"/>
+        <p14:creationId xmlns:p14="http://schemas.microsoft.com/office/powerpoint/2010/main" val="12506029"/>
       </p:ext>
     </p:extLst>
   </p:cSld>
@@ -4584,7 +4628,7 @@
           <p:cNvPr id="2" name="Title 1">
             <a:extLst>
               <a:ext uri="{FF2B5EF4-FFF2-40B4-BE49-F238E27FC236}">
-                <a16:creationId xmlns:a16="http://schemas.microsoft.com/office/drawing/2014/main" id="{F6B59F71-2AA1-473B-8392-47DBF3A0050F}"/>
+                <a16:creationId xmlns:a16="http://schemas.microsoft.com/office/drawing/2014/main" id="{EB412D7F-D4A8-49E0-AC28-E5D3BDAF513D}"/>
               </a:ext>
             </a:extLst>
           </p:cNvPr>
@@ -4602,7 +4646,7 @@
           <a:p>
             <a:r>
               <a:rPr lang="pl-PL" dirty="0"/>
-              <a:t>Ten: Reporting</a:t>
+              <a:t>Nine: IgnoreIf, Requires</a:t>
             </a:r>
             <a:endParaRPr lang="en-US" dirty="0"/>
           </a:p>
@@ -4613,7 +4657,7 @@
           <p:cNvPr id="3" name="Content Placeholder 2">
             <a:extLst>
               <a:ext uri="{FF2B5EF4-FFF2-40B4-BE49-F238E27FC236}">
-                <a16:creationId xmlns:a16="http://schemas.microsoft.com/office/drawing/2014/main" id="{EB5D0AA9-A5FC-4EE7-B1C0-355BC33680BB}"/>
+                <a16:creationId xmlns:a16="http://schemas.microsoft.com/office/drawing/2014/main" id="{91BA6425-9C75-4C98-B2EC-56470896570E}"/>
               </a:ext>
             </a:extLst>
           </p:cNvPr>
@@ -4631,25 +4675,31 @@
           <a:p>
             <a:r>
               <a:rPr lang="pl-PL" dirty="0"/>
-              <a:t>HTML reports after each run</a:t>
-            </a:r>
-          </a:p>
-          <a:p>
+              <a:t>Conditionally execute tests depending on the environment:</a:t>
+            </a:r>
+          </a:p>
+          <a:p>
+            <a:pPr lvl="1"/>
+            <a:r>
+              <a:rPr lang="pl-PL" dirty="0"/>
+              <a:t>On particular JVM,</a:t>
+            </a:r>
+          </a:p>
+          <a:p>
+            <a:pPr lvl="1"/>
+            <a:r>
+              <a:rPr lang="pl-PL" dirty="0"/>
+              <a:t>On particular system,</a:t>
+            </a:r>
+          </a:p>
+          <a:p>
+            <a:pPr lvl="1"/>
             <a:endParaRPr lang="pl-PL" dirty="0"/>
           </a:p>
           <a:p>
             <a:r>
               <a:rPr lang="pl-PL" dirty="0"/>
-              <a:t>Good visualization of performed steps</a:t>
-            </a:r>
-          </a:p>
-          <a:p>
-            <a:endParaRPr lang="pl-PL" dirty="0"/>
-          </a:p>
-          <a:p>
-            <a:r>
-              <a:rPr lang="pl-PL" dirty="0"/>
-              <a:t>Good visualization of errors</a:t>
+              <a:t>Can use your own static methods too!</a:t>
             </a:r>
           </a:p>
         </p:txBody>
@@ -4657,7 +4707,7 @@
     </p:spTree>
     <p:extLst>
       <p:ext uri="{BB962C8B-B14F-4D97-AF65-F5344CB8AC3E}">
-        <p14:creationId xmlns:p14="http://schemas.microsoft.com/office/powerpoint/2010/main" val="12506029"/>
+        <p14:creationId xmlns:p14="http://schemas.microsoft.com/office/powerpoint/2010/main" val="172977477"/>
       </p:ext>
     </p:extLst>
   </p:cSld>
@@ -4668,6 +4718,172 @@
 </file>
 
 <file path=ppt/slides/slide15.xml><?xml version="1.0" encoding="utf-8"?>
+<p:sld xmlns:a="http://schemas.openxmlformats.org/drawingml/2006/main" xmlns:r="http://schemas.openxmlformats.org/officeDocument/2006/relationships" xmlns:p="http://schemas.openxmlformats.org/presentationml/2006/main">
+  <p:cSld>
+    <p:spTree>
+      <p:nvGrpSpPr>
+        <p:cNvPr id="1" name=""/>
+        <p:cNvGrpSpPr/>
+        <p:nvPr/>
+      </p:nvGrpSpPr>
+      <p:grpSpPr>
+        <a:xfrm>
+          <a:off x="0" y="0"/>
+          <a:ext cx="0" cy="0"/>
+          <a:chOff x="0" y="0"/>
+          <a:chExt cx="0" cy="0"/>
+        </a:xfrm>
+      </p:grpSpPr>
+      <p:sp>
+        <p:nvSpPr>
+          <p:cNvPr id="2" name="Title 1">
+            <a:extLst>
+              <a:ext uri="{FF2B5EF4-FFF2-40B4-BE49-F238E27FC236}">
+                <a16:creationId xmlns:a16="http://schemas.microsoft.com/office/drawing/2014/main" id="{62BFE644-28B8-487C-AD40-EC60928ECBC4}"/>
+              </a:ext>
+            </a:extLst>
+          </p:cNvPr>
+          <p:cNvSpPr>
+            <a:spLocks noGrp="1"/>
+          </p:cNvSpPr>
+          <p:nvPr>
+            <p:ph type="title"/>
+          </p:nvPr>
+        </p:nvSpPr>
+        <p:spPr/>
+        <p:txBody>
+          <a:bodyPr/>
+          <a:lstStyle/>
+          <a:p>
+            <a:r>
+              <a:rPr lang="pl-PL" dirty="0"/>
+              <a:t>Ten: Retry</a:t>
+            </a:r>
+            <a:endParaRPr lang="en-US" dirty="0"/>
+          </a:p>
+        </p:txBody>
+      </p:sp>
+      <p:sp>
+        <p:nvSpPr>
+          <p:cNvPr id="3" name="Content Placeholder 2">
+            <a:extLst>
+              <a:ext uri="{FF2B5EF4-FFF2-40B4-BE49-F238E27FC236}">
+                <a16:creationId xmlns:a16="http://schemas.microsoft.com/office/drawing/2014/main" id="{A9B88B67-ACF3-4D29-B242-7A62473F4EF9}"/>
+              </a:ext>
+            </a:extLst>
+          </p:cNvPr>
+          <p:cNvSpPr>
+            <a:spLocks noGrp="1"/>
+          </p:cNvSpPr>
+          <p:nvPr>
+            <p:ph idx="1"/>
+          </p:nvPr>
+        </p:nvSpPr>
+        <p:spPr/>
+        <p:txBody>
+          <a:bodyPr/>
+          <a:lstStyle/>
+          <a:p>
+            <a:r>
+              <a:rPr lang="pl-PL" dirty="0"/>
+              <a:t>Some tests may occasionally fail (and you expect that to happen)</a:t>
+            </a:r>
+          </a:p>
+          <a:p>
+            <a:pPr lvl="1"/>
+            <a:r>
+              <a:rPr lang="pl-PL" dirty="0"/>
+              <a:t>@Retry for the </a:t>
+            </a:r>
+            <a:r>
+              <a:rPr lang="pl-PL" dirty="0" err="1"/>
+              <a:t>rescue</a:t>
+            </a:r>
+            <a:r>
+              <a:rPr lang="pl-PL" dirty="0"/>
+              <a:t>!</a:t>
+            </a:r>
+          </a:p>
+          <a:p>
+            <a:pPr lvl="1"/>
+            <a:r>
+              <a:rPr lang="pl-PL" dirty="0" err="1"/>
+              <a:t>Can</a:t>
+            </a:r>
+            <a:r>
+              <a:rPr lang="pl-PL" dirty="0"/>
+              <a:t> </a:t>
+            </a:r>
+            <a:r>
+              <a:rPr lang="pl-PL" dirty="0" err="1"/>
+              <a:t>specify</a:t>
+            </a:r>
+            <a:r>
+              <a:rPr lang="pl-PL" dirty="0"/>
+              <a:t> </a:t>
+            </a:r>
+            <a:r>
+              <a:rPr lang="pl-PL" dirty="0" err="1"/>
+              <a:t>how</a:t>
+            </a:r>
+            <a:r>
+              <a:rPr lang="pl-PL" dirty="0"/>
+              <a:t> </a:t>
+            </a:r>
+            <a:r>
+              <a:rPr lang="pl-PL" dirty="0" err="1"/>
+              <a:t>many</a:t>
+            </a:r>
+            <a:r>
+              <a:rPr lang="pl-PL" dirty="0"/>
+              <a:t> </a:t>
+            </a:r>
+            <a:r>
+              <a:rPr lang="pl-PL" dirty="0" err="1"/>
+              <a:t>attempts</a:t>
+            </a:r>
+            <a:r>
+              <a:rPr lang="pl-PL" dirty="0"/>
+              <a:t> we </a:t>
+            </a:r>
+            <a:r>
+              <a:rPr lang="pl-PL" dirty="0" err="1"/>
+              <a:t>have</a:t>
+            </a:r>
+            <a:r>
+              <a:rPr lang="pl-PL" dirty="0"/>
+              <a:t> </a:t>
+            </a:r>
+            <a:r>
+              <a:rPr lang="pl-PL" dirty="0" err="1"/>
+              <a:t>before</a:t>
+            </a:r>
+            <a:r>
+              <a:rPr lang="pl-PL" dirty="0"/>
+              <a:t> test </a:t>
+            </a:r>
+            <a:r>
+              <a:rPr lang="pl-PL" dirty="0" err="1"/>
+              <a:t>fails</a:t>
+            </a:r>
+            <a:endParaRPr lang="pl-PL" dirty="0"/>
+          </a:p>
+        </p:txBody>
+      </p:sp>
+    </p:spTree>
+    <p:extLst>
+      <p:ext uri="{BB962C8B-B14F-4D97-AF65-F5344CB8AC3E}">
+        <p14:creationId xmlns:p14="http://schemas.microsoft.com/office/powerpoint/2010/main" val="1298915062"/>
+      </p:ext>
+    </p:extLst>
+  </p:cSld>
+  <p:clrMapOvr>
+    <a:masterClrMapping/>
+  </p:clrMapOvr>
+</p:sld>
+</file>
+
+<file path=ppt/slides/slide16.xml><?xml version="1.0" encoding="utf-8"?>
 <p:sld xmlns:a="http://schemas.openxmlformats.org/drawingml/2006/main" xmlns:r="http://schemas.openxmlformats.org/officeDocument/2006/relationships" xmlns:p="http://schemas.openxmlformats.org/presentationml/2006/main">
   <p:cSld>
     <p:spTree>
@@ -4834,7 +5050,9 @@
         </p:nvSpPr>
         <p:spPr/>
         <p:txBody>
-          <a:bodyPr/>
+          <a:bodyPr>
+            <a:normAutofit/>
+          </a:bodyPr>
           <a:lstStyle/>
           <a:p>
             <a:pPr marL="0" indent="0">
@@ -4849,22 +5067,58 @@
             <a:pPr marL="0" indent="0">
               <a:buNone/>
             </a:pPr>
-            <a:r>
-              <a:rPr lang="pl-PL" dirty="0"/>
-              <a:t>Advisory Software Engineer, Product Owner</a:t>
-            </a:r>
+            <a:endParaRPr lang="pl-PL" dirty="0"/>
           </a:p>
           <a:p>
             <a:pPr marL="0" indent="0">
               <a:buNone/>
             </a:pPr>
             <a:r>
-              <a:rPr lang="pl-PL" dirty="0"/>
-              <a:t> 	</a:t>
+              <a:rPr lang="pl-PL" dirty="0" err="1"/>
+              <a:t>Advisory</a:t>
+            </a:r>
+            <a:r>
+              <a:rPr lang="pl-PL" dirty="0"/>
+              <a:t> Software Engineer, Product </a:t>
+            </a:r>
+            <a:r>
+              <a:rPr lang="pl-PL" dirty="0" err="1"/>
+              <a:t>Owner</a:t>
+            </a:r>
+            <a:r>
+              <a:rPr lang="pl-PL" dirty="0"/>
+              <a:t> </a:t>
             </a:r>
           </a:p>
           <a:p>
             <a:pPr marL="0" indent="0">
+              <a:buNone/>
+            </a:pPr>
+            <a:endParaRPr lang="pl-PL" dirty="0"/>
+          </a:p>
+          <a:p>
+            <a:pPr marL="0" indent="0">
+              <a:buNone/>
+            </a:pPr>
+            <a:endParaRPr lang="pl-PL" dirty="0"/>
+          </a:p>
+          <a:p>
+            <a:pPr marL="0" indent="0">
+              <a:buNone/>
+            </a:pPr>
+            <a:endParaRPr lang="pl-PL" dirty="0"/>
+          </a:p>
+          <a:p>
+            <a:pPr marL="0" indent="0">
+              <a:buNone/>
+            </a:pPr>
+            <a:r>
+              <a:rPr lang="pl-PL" dirty="0"/>
+              <a:t>	</a:t>
+            </a:r>
+          </a:p>
+          <a:p>
+            <a:pPr marL="0" indent="0" algn="r">
               <a:buNone/>
             </a:pPr>
             <a:r>
@@ -4921,7 +5175,7 @@
         </p:blipFill>
         <p:spPr bwMode="auto">
           <a:xfrm>
-            <a:off x="1042737" y="3226914"/>
+            <a:off x="9117791" y="5248899"/>
             <a:ext cx="725905" cy="725905"/>
           </a:xfrm>
           <a:prstGeom prst="rect">
@@ -5188,7 +5442,7 @@
           <p:cNvPr id="2" name="Title 1">
             <a:extLst>
               <a:ext uri="{FF2B5EF4-FFF2-40B4-BE49-F238E27FC236}">
-                <a16:creationId xmlns:a16="http://schemas.microsoft.com/office/drawing/2014/main" id="{1DA53251-CB05-4B23-BC19-43395C1C84F3}"/>
+                <a16:creationId xmlns:a16="http://schemas.microsoft.com/office/drawing/2014/main" id="{EEDF95A2-3F94-074E-B74D-0A794A8DB045}"/>
               </a:ext>
             </a:extLst>
           </p:cNvPr>
@@ -5206,9 +5460,13 @@
           <a:p>
             <a:r>
               <a:rPr lang="pl-PL" dirty="0"/>
-              <a:t> One: Basics</a:t>
-            </a:r>
-            <a:endParaRPr lang="en-US" dirty="0"/>
+              <a:t>First </a:t>
+            </a:r>
+            <a:r>
+              <a:rPr lang="pl-PL" dirty="0" err="1"/>
+              <a:t>steps</a:t>
+            </a:r>
+            <a:endParaRPr lang="pl-PL" dirty="0"/>
           </a:p>
         </p:txBody>
       </p:sp>
@@ -5217,7 +5475,7 @@
           <p:cNvPr id="3" name="Content Placeholder 2">
             <a:extLst>
               <a:ext uri="{FF2B5EF4-FFF2-40B4-BE49-F238E27FC236}">
-                <a16:creationId xmlns:a16="http://schemas.microsoft.com/office/drawing/2014/main" id="{945233D8-8867-4FDC-9AB7-3B7D92EE7F30}"/>
+                <a16:creationId xmlns:a16="http://schemas.microsoft.com/office/drawing/2014/main" id="{F87489BF-25C1-284C-8EC4-6A72DC32280F}"/>
               </a:ext>
             </a:extLst>
           </p:cNvPr>
@@ -5230,109 +5488,195 @@
         </p:nvSpPr>
         <p:spPr/>
         <p:txBody>
-          <a:bodyPr>
-            <a:normAutofit/>
-          </a:bodyPr>
-          <a:lstStyle/>
-          <a:p>
-            <a:r>
-              <a:rPr lang="pl-PL" dirty="0"/>
-              <a:t>Single dependency brings all required stuff</a:t>
-            </a:r>
+          <a:bodyPr/>
+          <a:lstStyle/>
+          <a:p>
+            <a:r>
+              <a:rPr lang="pl-PL" dirty="0" err="1"/>
+              <a:t>Add</a:t>
+            </a:r>
+            <a:r>
+              <a:rPr lang="pl-PL" dirty="0"/>
+              <a:t> Spock </a:t>
+            </a:r>
+            <a:r>
+              <a:rPr lang="pl-PL" dirty="0" err="1"/>
+              <a:t>dependency</a:t>
+            </a:r>
+            <a:r>
+              <a:rPr lang="pl-PL" dirty="0"/>
+              <a:t> to </a:t>
+            </a:r>
+            <a:r>
+              <a:rPr lang="pl-PL" dirty="0" err="1"/>
+              <a:t>your</a:t>
+            </a:r>
+            <a:r>
+              <a:rPr lang="pl-PL" dirty="0"/>
+              <a:t> </a:t>
+            </a:r>
+            <a:r>
+              <a:rPr lang="pl-PL" dirty="0" err="1"/>
+              <a:t>maven</a:t>
+            </a:r>
+            <a:r>
+              <a:rPr lang="pl-PL" dirty="0"/>
+              <a:t> </a:t>
+            </a:r>
+            <a:r>
+              <a:rPr lang="pl-PL" dirty="0" err="1"/>
+              <a:t>project</a:t>
+            </a:r>
+            <a:endParaRPr lang="pl-PL" dirty="0"/>
           </a:p>
           <a:p>
             <a:pPr lvl="1"/>
             <a:r>
-              <a:rPr lang="pl-PL" dirty="0"/>
-              <a:t>Additionally brings JUnit too,</a:t>
-            </a:r>
-          </a:p>
-          <a:p>
-            <a:pPr marL="457200" lvl="1" indent="0">
-              <a:buNone/>
-            </a:pPr>
+              <a:rPr lang="pl-PL" dirty="0" err="1"/>
+              <a:t>Brings</a:t>
+            </a:r>
+            <a:r>
+              <a:rPr lang="pl-PL" dirty="0"/>
+              <a:t> </a:t>
+            </a:r>
+            <a:r>
+              <a:rPr lang="pl-PL" dirty="0" err="1"/>
+              <a:t>junit</a:t>
+            </a:r>
             <a:endParaRPr lang="pl-PL" dirty="0"/>
           </a:p>
           <a:p>
-            <a:r>
-              <a:rPr lang="pl-PL" dirty="0"/>
-              <a:t>Tests are called Specifications</a:t>
-            </a:r>
-          </a:p>
-          <a:p>
+            <a:pPr lvl="1"/>
+            <a:r>
+              <a:rPr lang="pl-PL" dirty="0" err="1"/>
+              <a:t>Brings</a:t>
+            </a:r>
+            <a:r>
+              <a:rPr lang="pl-PL" dirty="0"/>
+              <a:t> </a:t>
+            </a:r>
+            <a:r>
+              <a:rPr lang="pl-PL" dirty="0" err="1"/>
+              <a:t>groovy</a:t>
+            </a:r>
             <a:endParaRPr lang="pl-PL" dirty="0"/>
           </a:p>
           <a:p>
-            <a:r>
-              <a:rPr lang="pl-PL" dirty="0"/>
-              <a:t>Test name can be a normal String</a:t>
-            </a:r>
-          </a:p>
-          <a:p>
             <a:endParaRPr lang="pl-PL" dirty="0"/>
           </a:p>
           <a:p>
             <a:r>
-              <a:rPr lang="pl-PL" dirty="0"/>
-              <a:t>Key words required to compile:</a:t>
-            </a:r>
-          </a:p>
-          <a:p>
-            <a:pPr lvl="1"/>
-            <a:r>
-              <a:rPr lang="pl-PL" i="1" dirty="0"/>
-              <a:t>given:</a:t>
-            </a:r>
-            <a:r>
-              <a:rPr lang="pl-PL" dirty="0"/>
-              <a:t> | </a:t>
-            </a:r>
-            <a:r>
-              <a:rPr lang="pl-PL" i="1" dirty="0"/>
-              <a:t>when: </a:t>
-            </a:r>
-            <a:r>
-              <a:rPr lang="pl-PL" dirty="0"/>
-              <a:t>| </a:t>
-            </a:r>
-            <a:r>
-              <a:rPr lang="pl-PL" i="1" dirty="0"/>
-              <a:t>then: </a:t>
-            </a:r>
-            <a:r>
-              <a:rPr lang="pl-PL" dirty="0"/>
-              <a:t>| </a:t>
-            </a:r>
-            <a:r>
-              <a:rPr lang="pl-PL" i="1" dirty="0"/>
-              <a:t>expect:</a:t>
-            </a:r>
-            <a:r>
-              <a:rPr lang="pl-PL" dirty="0"/>
-              <a:t> (and </a:t>
-            </a:r>
-            <a:r>
-              <a:rPr lang="pl-PL" i="1" dirty="0"/>
-              <a:t>and:</a:t>
+              <a:rPr lang="pl-PL" dirty="0" err="1"/>
+              <a:t>Configure</a:t>
             </a:r>
             <a:r>
               <a:rPr lang="pl-PL" dirty="0"/>
               <a:t> </a:t>
             </a:r>
             <a:r>
-              <a:rPr lang="pl-PL" dirty="0">
-                <a:sym typeface="Wingdings" panose="05000000000000000000" pitchFamily="2" charset="2"/>
-              </a:rPr>
-              <a:t>)</a:t>
-            </a:r>
-            <a:endParaRPr lang="en-US" dirty="0"/>
+              <a:rPr lang="pl-PL" dirty="0" err="1"/>
+              <a:t>maven</a:t>
+            </a:r>
+            <a:r>
+              <a:rPr lang="pl-PL" dirty="0"/>
+              <a:t> </a:t>
+            </a:r>
+            <a:r>
+              <a:rPr lang="pl-PL" dirty="0" err="1"/>
+              <a:t>compiler</a:t>
+            </a:r>
+            <a:r>
+              <a:rPr lang="pl-PL" dirty="0"/>
+              <a:t> for </a:t>
+            </a:r>
+            <a:r>
+              <a:rPr lang="pl-PL" dirty="0" err="1"/>
+              <a:t>groovy</a:t>
+            </a:r>
+            <a:endParaRPr lang="pl-PL" dirty="0"/>
+          </a:p>
+          <a:p>
+            <a:endParaRPr lang="pl-PL" dirty="0"/>
+          </a:p>
+          <a:p>
+            <a:r>
+              <a:rPr lang="pl-PL" dirty="0" err="1"/>
+              <a:t>Configure</a:t>
+            </a:r>
+            <a:r>
+              <a:rPr lang="pl-PL" dirty="0"/>
+              <a:t> </a:t>
+            </a:r>
+            <a:r>
+              <a:rPr lang="pl-PL" dirty="0" err="1"/>
+              <a:t>surefire</a:t>
+            </a:r>
+            <a:r>
+              <a:rPr lang="pl-PL" dirty="0"/>
+              <a:t> to </a:t>
+            </a:r>
+            <a:r>
+              <a:rPr lang="pl-PL" dirty="0" err="1"/>
+              <a:t>pick</a:t>
+            </a:r>
+            <a:r>
+              <a:rPr lang="pl-PL" dirty="0"/>
+              <a:t> </a:t>
+            </a:r>
+            <a:r>
+              <a:rPr lang="pl-PL" dirty="0" err="1"/>
+              <a:t>up</a:t>
+            </a:r>
+            <a:r>
+              <a:rPr lang="pl-PL" dirty="0"/>
+              <a:t> **Spec </a:t>
+            </a:r>
+            <a:r>
+              <a:rPr lang="pl-PL" dirty="0" err="1"/>
+              <a:t>files</a:t>
+            </a:r>
+            <a:endParaRPr lang="pl-PL" dirty="0"/>
+          </a:p>
+          <a:p>
+            <a:endParaRPr lang="pl-PL" dirty="0"/>
+          </a:p>
+          <a:p>
+            <a:r>
+              <a:rPr lang="pl-PL" dirty="0" err="1"/>
+              <a:t>Optional</a:t>
+            </a:r>
+            <a:r>
+              <a:rPr lang="pl-PL" dirty="0"/>
+              <a:t> – </a:t>
+            </a:r>
+            <a:r>
+              <a:rPr lang="pl-PL" dirty="0" err="1"/>
+              <a:t>IntelliJ</a:t>
+            </a:r>
+            <a:r>
+              <a:rPr lang="pl-PL" dirty="0"/>
+              <a:t> Spock </a:t>
+            </a:r>
+            <a:r>
+              <a:rPr lang="pl-PL" dirty="0" err="1"/>
+              <a:t>enhancements</a:t>
+            </a:r>
+            <a:r>
+              <a:rPr lang="pl-PL" dirty="0"/>
+              <a:t> </a:t>
+            </a:r>
+            <a:r>
+              <a:rPr lang="pl-PL" dirty="0" err="1"/>
+              <a:t>plugin</a:t>
+            </a:r>
+            <a:endParaRPr lang="pl-PL" dirty="0"/>
           </a:p>
         </p:txBody>
       </p:sp>
     </p:spTree>
     <p:extLst>
       <p:ext uri="{BB962C8B-B14F-4D97-AF65-F5344CB8AC3E}">
-        <p14:creationId xmlns:p14="http://schemas.microsoft.com/office/powerpoint/2010/main" val="2268459902"/>
+        <p14:creationId xmlns:p14="http://schemas.microsoft.com/office/powerpoint/2010/main" val="3864851573"/>
       </p:ext>
     </p:extLst>
   </p:cSld>
@@ -5364,7 +5708,7 @@
           <p:cNvPr id="2" name="Title 1">
             <a:extLst>
               <a:ext uri="{FF2B5EF4-FFF2-40B4-BE49-F238E27FC236}">
-                <a16:creationId xmlns:a16="http://schemas.microsoft.com/office/drawing/2014/main" id="{88DFEC71-1F4C-4270-9FE5-5CEAC06DD6E7}"/>
+                <a16:creationId xmlns:a16="http://schemas.microsoft.com/office/drawing/2014/main" id="{1DA53251-CB05-4B23-BC19-43395C1C84F3}"/>
               </a:ext>
             </a:extLst>
           </p:cNvPr>
@@ -5382,7 +5726,7 @@
           <a:p>
             <a:r>
               <a:rPr lang="pl-PL" dirty="0"/>
-              <a:t>Two: Supports Many JVM languages</a:t>
+              <a:t> One: Basics</a:t>
             </a:r>
             <a:endParaRPr lang="en-US" dirty="0"/>
           </a:p>
@@ -5393,7 +5737,7 @@
           <p:cNvPr id="3" name="Content Placeholder 2">
             <a:extLst>
               <a:ext uri="{FF2B5EF4-FFF2-40B4-BE49-F238E27FC236}">
-                <a16:creationId xmlns:a16="http://schemas.microsoft.com/office/drawing/2014/main" id="{DC7B1C54-D5A7-429C-A3DD-DC89FC2C14D5}"/>
+                <a16:creationId xmlns:a16="http://schemas.microsoft.com/office/drawing/2014/main" id="{945233D8-8867-4FDC-9AB7-3B7D92EE7F30}"/>
               </a:ext>
             </a:extLst>
           </p:cNvPr>
@@ -5406,33 +5750,122 @@
         </p:nvSpPr>
         <p:spPr/>
         <p:txBody>
-          <a:bodyPr/>
-          <a:lstStyle/>
-          <a:p>
-            <a:r>
-              <a:rPr lang="pl-PL" dirty="0"/>
-              <a:t>Examples:</a:t>
+          <a:bodyPr>
+            <a:normAutofit/>
+          </a:bodyPr>
+          <a:lstStyle/>
+          <a:p>
+            <a:r>
+              <a:rPr lang="pl-PL" dirty="0" err="1"/>
+              <a:t>Tests</a:t>
+            </a:r>
+            <a:r>
+              <a:rPr lang="pl-PL" dirty="0"/>
+              <a:t> are </a:t>
+            </a:r>
+            <a:r>
+              <a:rPr lang="pl-PL" dirty="0" err="1"/>
+              <a:t>called</a:t>
+            </a:r>
+            <a:r>
+              <a:rPr lang="pl-PL" dirty="0"/>
+              <a:t> </a:t>
+            </a:r>
+            <a:r>
+              <a:rPr lang="pl-PL" dirty="0" err="1"/>
+              <a:t>Specifications</a:t>
+            </a:r>
+            <a:r>
+              <a:rPr lang="pl-PL" dirty="0"/>
+              <a:t> and </a:t>
+            </a:r>
+            <a:r>
+              <a:rPr lang="pl-PL" dirty="0" err="1"/>
+              <a:t>extend</a:t>
+            </a:r>
+            <a:r>
+              <a:rPr lang="pl-PL" dirty="0"/>
+              <a:t> from </a:t>
+            </a:r>
+            <a:r>
+              <a:rPr lang="pl-PL" dirty="0" err="1"/>
+              <a:t>Specification</a:t>
+            </a:r>
+            <a:r>
+              <a:rPr lang="pl-PL" dirty="0"/>
+              <a:t> </a:t>
+            </a:r>
+            <a:r>
+              <a:rPr lang="pl-PL"/>
+              <a:t>class</a:t>
+            </a:r>
+            <a:endParaRPr lang="pl-PL" dirty="0"/>
+          </a:p>
+          <a:p>
+            <a:endParaRPr lang="pl-PL" dirty="0"/>
+          </a:p>
+          <a:p>
+            <a:r>
+              <a:rPr lang="pl-PL" dirty="0"/>
+              <a:t>Test name can be a normal String</a:t>
+            </a:r>
+          </a:p>
+          <a:p>
+            <a:endParaRPr lang="pl-PL" dirty="0"/>
+          </a:p>
+          <a:p>
+            <a:r>
+              <a:rPr lang="pl-PL" dirty="0"/>
+              <a:t>Key words required to compile:</a:t>
             </a:r>
           </a:p>
           <a:p>
             <a:pPr lvl="1"/>
             <a:r>
-              <a:rPr lang="pl-PL" dirty="0"/>
-              <a:t>Java</a:t>
-            </a:r>
-          </a:p>
-          <a:p>
-            <a:pPr lvl="1"/>
-            <a:r>
-              <a:rPr lang="pl-PL" dirty="0"/>
-              <a:t>Kotlin</a:t>
-            </a:r>
-          </a:p>
-          <a:p>
-            <a:pPr lvl="1"/>
-            <a:r>
-              <a:rPr lang="pl-PL" dirty="0"/>
-              <a:t>Groovy </a:t>
+              <a:rPr lang="pl-PL" i="1" dirty="0"/>
+              <a:t>given:</a:t>
+            </a:r>
+            <a:r>
+              <a:rPr lang="pl-PL" dirty="0"/>
+              <a:t> | </a:t>
+            </a:r>
+            <a:r>
+              <a:rPr lang="pl-PL" i="1" dirty="0"/>
+              <a:t>when: </a:t>
+            </a:r>
+            <a:r>
+              <a:rPr lang="pl-PL" dirty="0"/>
+              <a:t>| </a:t>
+            </a:r>
+            <a:r>
+              <a:rPr lang="pl-PL" i="1" dirty="0"/>
+              <a:t>then: </a:t>
+            </a:r>
+            <a:r>
+              <a:rPr lang="pl-PL" dirty="0"/>
+              <a:t>| </a:t>
+            </a:r>
+            <a:r>
+              <a:rPr lang="pl-PL" i="1" dirty="0"/>
+              <a:t>expect:</a:t>
+            </a:r>
+            <a:r>
+              <a:rPr lang="pl-PL" dirty="0"/>
+              <a:t> (and </a:t>
+            </a:r>
+            <a:r>
+              <a:rPr lang="pl-PL" i="1" dirty="0"/>
+              <a:t>and:</a:t>
+            </a:r>
+            <a:r>
+              <a:rPr lang="pl-PL" dirty="0"/>
+              <a:t> </a:t>
+            </a:r>
+            <a:r>
+              <a:rPr lang="pl-PL" dirty="0">
+                <a:sym typeface="Wingdings" panose="05000000000000000000" pitchFamily="2" charset="2"/>
+              </a:rPr>
+              <a:t>)</a:t>
             </a:r>
             <a:endParaRPr lang="en-US" dirty="0"/>
           </a:p>
@@ -5441,7 +5874,7 @@
     </p:spTree>
     <p:extLst>
       <p:ext uri="{BB962C8B-B14F-4D97-AF65-F5344CB8AC3E}">
-        <p14:creationId xmlns:p14="http://schemas.microsoft.com/office/powerpoint/2010/main" val="339257106"/>
+        <p14:creationId xmlns:p14="http://schemas.microsoft.com/office/powerpoint/2010/main" val="2268459902"/>
       </p:ext>
     </p:extLst>
   </p:cSld>
@@ -5473,7 +5906,7 @@
           <p:cNvPr id="2" name="Title 1">
             <a:extLst>
               <a:ext uri="{FF2B5EF4-FFF2-40B4-BE49-F238E27FC236}">
-                <a16:creationId xmlns:a16="http://schemas.microsoft.com/office/drawing/2014/main" id="{500B5D04-468C-464B-8E35-FC7BEBEDA3CF}"/>
+                <a16:creationId xmlns:a16="http://schemas.microsoft.com/office/drawing/2014/main" id="{88DFEC71-1F4C-4270-9FE5-5CEAC06DD6E7}"/>
               </a:ext>
             </a:extLst>
           </p:cNvPr>
@@ -5491,13 +5924,9 @@
           <a:p>
             <a:r>
               <a:rPr lang="pl-PL" dirty="0"/>
-              <a:t>Three: Power of </a:t>
-            </a:r>
-            <a:r>
-              <a:rPr lang="pl-PL" i="1" dirty="0"/>
-              <a:t>where:</a:t>
-            </a:r>
-            <a:endParaRPr lang="en-US" i="1" dirty="0"/>
+              <a:t>Two: Supports Many JVM languages</a:t>
+            </a:r>
+            <a:endParaRPr lang="en-US" dirty="0"/>
           </a:p>
         </p:txBody>
       </p:sp>
@@ -5506,7 +5935,7 @@
           <p:cNvPr id="3" name="Content Placeholder 2">
             <a:extLst>
               <a:ext uri="{FF2B5EF4-FFF2-40B4-BE49-F238E27FC236}">
-                <a16:creationId xmlns:a16="http://schemas.microsoft.com/office/drawing/2014/main" id="{0C00AC9E-181D-4A63-B034-9C5EB683747F}"/>
+                <a16:creationId xmlns:a16="http://schemas.microsoft.com/office/drawing/2014/main" id="{DC7B1C54-D5A7-429C-A3DD-DC89FC2C14D5}"/>
               </a:ext>
             </a:extLst>
           </p:cNvPr>
@@ -5524,39 +5953,29 @@
           <a:p>
             <a:r>
               <a:rPr lang="pl-PL" dirty="0"/>
-              <a:t>Easily parametrize the tests,</a:t>
-            </a:r>
-            <a:br>
-              <a:rPr lang="pl-PL" dirty="0"/>
-            </a:br>
-            <a:endParaRPr lang="pl-PL" dirty="0"/>
-          </a:p>
-          <a:p>
-            <a:r>
-              <a:rPr lang="pl-PL" dirty="0"/>
-              <a:t>Separate each test iteration in the report,</a:t>
-            </a:r>
-            <a:br>
-              <a:rPr lang="pl-PL" dirty="0"/>
-            </a:br>
-            <a:endParaRPr lang="pl-PL" dirty="0"/>
-          </a:p>
-          <a:p>
-            <a:r>
-              <a:rPr lang="pl-PL" dirty="0"/>
-              <a:t>Use parameters not only in code but also in test names,</a:t>
-            </a:r>
-          </a:p>
-          <a:p>
-            <a:endParaRPr lang="pl-PL" dirty="0"/>
-          </a:p>
-          <a:p>
-            <a:r>
-              <a:rPr lang="pl-PL" dirty="0"/>
-              <a:t>One line change for new test resources</a:t>
-            </a:r>
-          </a:p>
-          <a:p>
+              <a:t>Examples:</a:t>
+            </a:r>
+          </a:p>
+          <a:p>
+            <a:pPr lvl="1"/>
+            <a:r>
+              <a:rPr lang="pl-PL" dirty="0"/>
+              <a:t>Java</a:t>
+            </a:r>
+          </a:p>
+          <a:p>
+            <a:pPr lvl="1"/>
+            <a:r>
+              <a:rPr lang="pl-PL" dirty="0"/>
+              <a:t>Kotlin</a:t>
+            </a:r>
+          </a:p>
+          <a:p>
+            <a:pPr lvl="1"/>
+            <a:r>
+              <a:rPr lang="pl-PL" dirty="0"/>
+              <a:t>Groovy </a:t>
+            </a:r>
             <a:endParaRPr lang="en-US" dirty="0"/>
           </a:p>
         </p:txBody>
@@ -5564,7 +5983,7 @@
     </p:spTree>
     <p:extLst>
       <p:ext uri="{BB962C8B-B14F-4D97-AF65-F5344CB8AC3E}">
-        <p14:creationId xmlns:p14="http://schemas.microsoft.com/office/powerpoint/2010/main" val="3869106860"/>
+        <p14:creationId xmlns:p14="http://schemas.microsoft.com/office/powerpoint/2010/main" val="339257106"/>
       </p:ext>
     </p:extLst>
   </p:cSld>
@@ -5596,7 +6015,7 @@
           <p:cNvPr id="2" name="Title 1">
             <a:extLst>
               <a:ext uri="{FF2B5EF4-FFF2-40B4-BE49-F238E27FC236}">
-                <a16:creationId xmlns:a16="http://schemas.microsoft.com/office/drawing/2014/main" id="{BB22C33F-4BB7-4BCA-82B5-7C96A3DDD2BA}"/>
+                <a16:creationId xmlns:a16="http://schemas.microsoft.com/office/drawing/2014/main" id="{500B5D04-468C-464B-8E35-FC7BEBEDA3CF}"/>
               </a:ext>
             </a:extLst>
           </p:cNvPr>
@@ -5614,9 +6033,13 @@
           <a:p>
             <a:r>
               <a:rPr lang="pl-PL" dirty="0"/>
-              <a:t>Four: Where without table</a:t>
-            </a:r>
-            <a:endParaRPr lang="en-US" dirty="0"/>
+              <a:t>Three: Power of </a:t>
+            </a:r>
+            <a:r>
+              <a:rPr lang="pl-PL" i="1" dirty="0"/>
+              <a:t>where:</a:t>
+            </a:r>
+            <a:endParaRPr lang="en-US" i="1" dirty="0"/>
           </a:p>
         </p:txBody>
       </p:sp>
@@ -5625,7 +6048,7 @@
           <p:cNvPr id="3" name="Content Placeholder 2">
             <a:extLst>
               <a:ext uri="{FF2B5EF4-FFF2-40B4-BE49-F238E27FC236}">
-                <a16:creationId xmlns:a16="http://schemas.microsoft.com/office/drawing/2014/main" id="{523D3B36-4278-40F6-B02A-160C44796862}"/>
+                <a16:creationId xmlns:a16="http://schemas.microsoft.com/office/drawing/2014/main" id="{0C00AC9E-181D-4A63-B034-9C5EB683747F}"/>
               </a:ext>
             </a:extLst>
           </p:cNvPr>
@@ -5643,30 +6066,39 @@
           <a:p>
             <a:r>
               <a:rPr lang="pl-PL" dirty="0"/>
-              <a:t>You can use anything that has Iterator for your </a:t>
-            </a:r>
-            <a:r>
-              <a:rPr lang="pl-PL" i="1" dirty="0"/>
-              <a:t>where: </a:t>
-            </a:r>
-            <a:r>
-              <a:rPr lang="pl-PL" dirty="0"/>
-              <a:t>data</a:t>
-            </a:r>
-          </a:p>
-          <a:p>
-            <a:pPr lvl="1"/>
-            <a:r>
-              <a:rPr lang="pl-PL" dirty="0"/>
-              <a:t>SQL query result,</a:t>
-            </a:r>
-          </a:p>
-          <a:p>
-            <a:pPr lvl="1"/>
-            <a:r>
-              <a:rPr lang="pl-PL" dirty="0"/>
-              <a:t>CSV data,</a:t>
-            </a:r>
+              <a:t>Easily parametrize the tests,</a:t>
+            </a:r>
+            <a:br>
+              <a:rPr lang="pl-PL" dirty="0"/>
+            </a:br>
+            <a:endParaRPr lang="pl-PL" dirty="0"/>
+          </a:p>
+          <a:p>
+            <a:r>
+              <a:rPr lang="pl-PL" dirty="0"/>
+              <a:t>Separate each test iteration in the report,</a:t>
+            </a:r>
+            <a:br>
+              <a:rPr lang="pl-PL" dirty="0"/>
+            </a:br>
+            <a:endParaRPr lang="pl-PL" dirty="0"/>
+          </a:p>
+          <a:p>
+            <a:r>
+              <a:rPr lang="pl-PL" dirty="0"/>
+              <a:t>Use parameters not only in code but also in test names,</a:t>
+            </a:r>
+          </a:p>
+          <a:p>
+            <a:endParaRPr lang="pl-PL" dirty="0"/>
+          </a:p>
+          <a:p>
+            <a:r>
+              <a:rPr lang="pl-PL" dirty="0"/>
+              <a:t>One line change for new test resources</a:t>
+            </a:r>
+          </a:p>
+          <a:p>
             <a:endParaRPr lang="en-US" dirty="0"/>
           </a:p>
         </p:txBody>
@@ -5674,7 +6106,7 @@
     </p:spTree>
     <p:extLst>
       <p:ext uri="{BB962C8B-B14F-4D97-AF65-F5344CB8AC3E}">
-        <p14:creationId xmlns:p14="http://schemas.microsoft.com/office/powerpoint/2010/main" val="1851876263"/>
+        <p14:creationId xmlns:p14="http://schemas.microsoft.com/office/powerpoint/2010/main" val="3869106860"/>
       </p:ext>
     </p:extLst>
   </p:cSld>
@@ -5706,7 +6138,7 @@
           <p:cNvPr id="2" name="Title 1">
             <a:extLst>
               <a:ext uri="{FF2B5EF4-FFF2-40B4-BE49-F238E27FC236}">
-                <a16:creationId xmlns:a16="http://schemas.microsoft.com/office/drawing/2014/main" id="{77C72468-1134-4985-A956-45364AAF84FB}"/>
+                <a16:creationId xmlns:a16="http://schemas.microsoft.com/office/drawing/2014/main" id="{BB22C33F-4BB7-4BCA-82B5-7C96A3DDD2BA}"/>
               </a:ext>
             </a:extLst>
           </p:cNvPr>
@@ -5724,7 +6156,7 @@
           <a:p>
             <a:r>
               <a:rPr lang="pl-PL" dirty="0"/>
-              <a:t>Five: Testing exceptions</a:t>
+              <a:t>Four: Where without table</a:t>
             </a:r>
             <a:endParaRPr lang="en-US" dirty="0"/>
           </a:p>
@@ -5735,7 +6167,7 @@
           <p:cNvPr id="3" name="Content Placeholder 2">
             <a:extLst>
               <a:ext uri="{FF2B5EF4-FFF2-40B4-BE49-F238E27FC236}">
-                <a16:creationId xmlns:a16="http://schemas.microsoft.com/office/drawing/2014/main" id="{8B27E01F-89F6-4F5F-A0D8-57D0463F0C7A}"/>
+                <a16:creationId xmlns:a16="http://schemas.microsoft.com/office/drawing/2014/main" id="{523D3B36-4278-40F6-B02A-160C44796862}"/>
               </a:ext>
             </a:extLst>
           </p:cNvPr>
@@ -5753,54 +6185,38 @@
           <a:p>
             <a:r>
               <a:rPr lang="pl-PL" dirty="0"/>
-              <a:t>In</a:t>
+              <a:t>You can use anything that has Iterator for your </a:t>
             </a:r>
             <a:r>
               <a:rPr lang="pl-PL" i="1" dirty="0"/>
-              <a:t> then: </a:t>
-            </a:r>
-            <a:r>
-              <a:rPr lang="pl-PL" dirty="0"/>
-              <a:t> you can check if exception was thrown/not thrown</a:t>
+              <a:t>where: </a:t>
+            </a:r>
+            <a:r>
+              <a:rPr lang="pl-PL" dirty="0"/>
+              <a:t>data</a:t>
             </a:r>
           </a:p>
           <a:p>
             <a:pPr lvl="1"/>
             <a:r>
               <a:rPr lang="pl-PL" dirty="0"/>
-              <a:t>thrown(ExceptionClass) </a:t>
+              <a:t>SQL query result,</a:t>
             </a:r>
           </a:p>
           <a:p>
             <a:pPr lvl="1"/>
             <a:r>
               <a:rPr lang="pl-PL" dirty="0"/>
-              <a:t>notThrown(ExceptionClass)</a:t>
-            </a:r>
-          </a:p>
-          <a:p>
-            <a:pPr lvl="1"/>
-            <a:endParaRPr lang="pl-PL" dirty="0"/>
-          </a:p>
-          <a:p>
-            <a:r>
-              <a:rPr lang="pl-PL" dirty="0"/>
-              <a:t> If needed, can also assign the Exception and test its fields</a:t>
-            </a:r>
-          </a:p>
-          <a:p>
-            <a:pPr lvl="1"/>
-            <a:r>
-              <a:rPr lang="pl-PL" dirty="0"/>
-              <a:t>e.g. checking messages</a:t>
-            </a:r>
+              <a:t>CSV data,</a:t>
+            </a:r>
+            <a:endParaRPr lang="en-US" dirty="0"/>
           </a:p>
         </p:txBody>
       </p:sp>
     </p:spTree>
     <p:extLst>
       <p:ext uri="{BB962C8B-B14F-4D97-AF65-F5344CB8AC3E}">
-        <p14:creationId xmlns:p14="http://schemas.microsoft.com/office/powerpoint/2010/main" val="3133017702"/>
+        <p14:creationId xmlns:p14="http://schemas.microsoft.com/office/powerpoint/2010/main" val="1851876263"/>
       </p:ext>
     </p:extLst>
   </p:cSld>

</xml_diff>